<commit_message>
know about text stylings
</commit_message>
<xml_diff>
--- a/css slides.pptx
+++ b/css slides.pptx
@@ -5,7 +5,7 @@
     <p:sldMasterId id="2147483842" r:id="rId1"/>
   </p:sldMasterIdLst>
   <p:notesMasterIdLst>
-    <p:notesMasterId r:id="rId30"/>
+    <p:notesMasterId r:id="rId33"/>
   </p:notesMasterIdLst>
   <p:sldIdLst>
     <p:sldId id="256" r:id="rId2"/>
@@ -36,6 +36,9 @@
     <p:sldId id="281" r:id="rId27"/>
     <p:sldId id="282" r:id="rId28"/>
     <p:sldId id="283" r:id="rId29"/>
+    <p:sldId id="284" r:id="rId30"/>
+    <p:sldId id="285" r:id="rId31"/>
+    <p:sldId id="286" r:id="rId32"/>
   </p:sldIdLst>
   <p:sldSz cx="12192000" cy="6858000"/>
   <p:notesSz cx="6858000" cy="9144000"/>
@@ -10488,6 +10491,178 @@
 </p:sld>
 </file>
 
+<file path=ppt/slides/slide29.xml><?xml version="1.0" encoding="utf-8"?>
+<p:sld xmlns:a="http://schemas.openxmlformats.org/drawingml/2006/main" xmlns:r="http://schemas.openxmlformats.org/officeDocument/2006/relationships" xmlns:p="http://schemas.openxmlformats.org/presentationml/2006/main">
+  <p:cSld>
+    <p:spTree>
+      <p:nvGrpSpPr>
+        <p:cNvPr id="1" name=""/>
+        <p:cNvGrpSpPr/>
+        <p:nvPr/>
+      </p:nvGrpSpPr>
+      <p:grpSpPr>
+        <a:xfrm>
+          <a:off x="0" y="0"/>
+          <a:ext cx="0" cy="0"/>
+          <a:chOff x="0" y="0"/>
+          <a:chExt cx="0" cy="0"/>
+        </a:xfrm>
+      </p:grpSpPr>
+      <p:sp>
+        <p:nvSpPr>
+          <p:cNvPr id="2" name="Title 1"/>
+          <p:cNvSpPr>
+            <a:spLocks noGrp="1"/>
+          </p:cNvSpPr>
+          <p:nvPr>
+            <p:ph type="title"/>
+          </p:nvPr>
+        </p:nvSpPr>
+        <p:spPr/>
+        <p:txBody>
+          <a:bodyPr/>
+          <a:lstStyle/>
+          <a:p>
+            <a:pPr fontAlgn="base"/>
+            <a:r>
+              <a:rPr lang="en-US" dirty="0"/>
+              <a:t>ID </a:t>
+            </a:r>
+            <a:r>
+              <a:rPr lang="en-US" dirty="0" smtClean="0"/>
+              <a:t>Selectors</a:t>
+            </a:r>
+            <a:endParaRPr lang="en-US" dirty="0"/>
+          </a:p>
+        </p:txBody>
+      </p:sp>
+      <p:sp>
+        <p:nvSpPr>
+          <p:cNvPr id="3" name="Content Placeholder 2"/>
+          <p:cNvSpPr>
+            <a:spLocks noGrp="1"/>
+          </p:cNvSpPr>
+          <p:nvPr>
+            <p:ph idx="1"/>
+          </p:nvPr>
+        </p:nvSpPr>
+        <p:spPr/>
+        <p:txBody>
+          <a:bodyPr>
+            <a:normAutofit/>
+          </a:bodyPr>
+          <a:lstStyle/>
+          <a:p>
+            <a:pPr fontAlgn="base"/>
+            <a:r>
+              <a:rPr lang="en-US" dirty="0"/>
+              <a:t>A</a:t>
+            </a:r>
+            <a:r>
+              <a:rPr lang="en-US" dirty="0" smtClean="0"/>
+              <a:t>n </a:t>
+            </a:r>
+            <a:r>
+              <a:rPr lang="en-US" dirty="0"/>
+              <a:t>ID selector, lets us assign a unique ID to an element.</a:t>
+            </a:r>
+          </a:p>
+          <a:p>
+            <a:pPr fontAlgn="base"/>
+            <a:r>
+              <a:rPr lang="en-US" dirty="0" smtClean="0"/>
+              <a:t>That </a:t>
+            </a:r>
+            <a:r>
+              <a:rPr lang="en-US" dirty="0"/>
+              <a:t>way, we're able to specifically target an element based </a:t>
+            </a:r>
+            <a:r>
+              <a:rPr lang="en-US" dirty="0" smtClean="0"/>
+              <a:t>on its </a:t>
+            </a:r>
+            <a:r>
+              <a:rPr lang="en-US" dirty="0"/>
+              <a:t>ID attribute</a:t>
+            </a:r>
+            <a:r>
+              <a:rPr lang="en-US" dirty="0" smtClean="0"/>
+              <a:t>.</a:t>
+            </a:r>
+            <a:endParaRPr lang="en-US" dirty="0"/>
+          </a:p>
+          <a:p>
+            <a:pPr fontAlgn="base"/>
+            <a:r>
+              <a:rPr lang="en-US" dirty="0"/>
+              <a:t>ID selectors are declared using the pound </a:t>
+            </a:r>
+            <a:r>
+              <a:rPr lang="en-US" dirty="0" smtClean="0"/>
+              <a:t>(#) symbol </a:t>
+            </a:r>
+            <a:r>
+              <a:rPr lang="en-US" dirty="0"/>
+              <a:t>followed by the ID name</a:t>
+            </a:r>
+            <a:r>
+              <a:rPr lang="en-US" dirty="0" smtClean="0"/>
+              <a:t>.</a:t>
+            </a:r>
+          </a:p>
+          <a:p>
+            <a:pPr fontAlgn="base"/>
+            <a:r>
+              <a:rPr lang="en-US" dirty="0"/>
+              <a:t>ID's are unique to the page, </a:t>
+            </a:r>
+            <a:r>
+              <a:rPr lang="en-US" dirty="0" smtClean="0"/>
+              <a:t>so it's </a:t>
+            </a:r>
+            <a:r>
+              <a:rPr lang="en-US" dirty="0"/>
+              <a:t>important to remember that an element can only have one ID.</a:t>
+            </a:r>
+          </a:p>
+          <a:p>
+            <a:pPr fontAlgn="base"/>
+            <a:r>
+              <a:rPr lang="en-US" dirty="0" smtClean="0"/>
+              <a:t>A </a:t>
+            </a:r>
+            <a:r>
+              <a:rPr lang="en-US" dirty="0"/>
+              <a:t>page can only have one element with the same ID name</a:t>
+            </a:r>
+            <a:r>
+              <a:rPr lang="en-US" dirty="0" smtClean="0"/>
+              <a:t>.</a:t>
+            </a:r>
+            <a:r>
+              <a:rPr lang="en-US" dirty="0"/>
+              <a:t/>
+            </a:r>
+            <a:br>
+              <a:rPr lang="en-US" dirty="0"/>
+            </a:br>
+            <a:endParaRPr lang="en-US" dirty="0"/>
+          </a:p>
+        </p:txBody>
+      </p:sp>
+    </p:spTree>
+    <p:extLst>
+      <p:ext uri="{BB962C8B-B14F-4D97-AF65-F5344CB8AC3E}">
+        <p14:creationId xmlns:p14="http://schemas.microsoft.com/office/powerpoint/2010/main" val="3261733118"/>
+      </p:ext>
+    </p:extLst>
+  </p:cSld>
+  <p:clrMapOvr>
+    <a:masterClrMapping/>
+  </p:clrMapOvr>
+</p:sld>
+</file>
+
 <file path=ppt/slides/slide3.xml><?xml version="1.0" encoding="utf-8"?>
 <p:sld xmlns:a="http://schemas.openxmlformats.org/drawingml/2006/main" xmlns:r="http://schemas.openxmlformats.org/officeDocument/2006/relationships" xmlns:p="http://schemas.openxmlformats.org/presentationml/2006/main">
   <p:cSld>
@@ -10567,6 +10742,301 @@
       </p:par>
     </p:tnLst>
   </p:timing>
+</p:sld>
+</file>
+
+<file path=ppt/slides/slide30.xml><?xml version="1.0" encoding="utf-8"?>
+<p:sld xmlns:a="http://schemas.openxmlformats.org/drawingml/2006/main" xmlns:r="http://schemas.openxmlformats.org/officeDocument/2006/relationships" xmlns:p="http://schemas.openxmlformats.org/presentationml/2006/main">
+  <p:cSld>
+    <p:spTree>
+      <p:nvGrpSpPr>
+        <p:cNvPr id="1" name=""/>
+        <p:cNvGrpSpPr/>
+        <p:nvPr/>
+      </p:nvGrpSpPr>
+      <p:grpSpPr>
+        <a:xfrm>
+          <a:off x="0" y="0"/>
+          <a:ext cx="0" cy="0"/>
+          <a:chOff x="0" y="0"/>
+          <a:chExt cx="0" cy="0"/>
+        </a:xfrm>
+      </p:grpSpPr>
+      <p:sp>
+        <p:nvSpPr>
+          <p:cNvPr id="2" name="Title 1"/>
+          <p:cNvSpPr>
+            <a:spLocks noGrp="1"/>
+          </p:cNvSpPr>
+          <p:nvPr>
+            <p:ph type="title"/>
+          </p:nvPr>
+        </p:nvSpPr>
+        <p:spPr/>
+        <p:txBody>
+          <a:bodyPr/>
+          <a:lstStyle/>
+          <a:p>
+            <a:pPr fontAlgn="base"/>
+            <a:r>
+              <a:rPr lang="en-US" dirty="0"/>
+              <a:t>Class </a:t>
+            </a:r>
+            <a:r>
+              <a:rPr lang="en-US" dirty="0" smtClean="0"/>
+              <a:t>Selectors</a:t>
+            </a:r>
+            <a:endParaRPr lang="en-US" dirty="0"/>
+          </a:p>
+        </p:txBody>
+      </p:sp>
+      <p:sp>
+        <p:nvSpPr>
+          <p:cNvPr id="3" name="Content Placeholder 2"/>
+          <p:cNvSpPr>
+            <a:spLocks noGrp="1"/>
+          </p:cNvSpPr>
+          <p:nvPr>
+            <p:ph idx="1"/>
+          </p:nvPr>
+        </p:nvSpPr>
+        <p:spPr/>
+        <p:txBody>
+          <a:bodyPr>
+            <a:normAutofit lnSpcReduction="10000"/>
+          </a:bodyPr>
+          <a:lstStyle/>
+          <a:p>
+            <a:r>
+              <a:rPr lang="en-US" dirty="0"/>
+              <a:t>Class selectors let us target elements based on their class attribute. The main difference between a class and an ID selector is that IDs are unique and they’re used to identify one element on the page, whereas a class can target more than one element</a:t>
+            </a:r>
+            <a:r>
+              <a:rPr lang="en-US" dirty="0" smtClean="0"/>
+              <a:t>.</a:t>
+            </a:r>
+          </a:p>
+          <a:p>
+            <a:pPr fontAlgn="base"/>
+            <a:r>
+              <a:rPr lang="en-US" dirty="0"/>
+              <a:t>T</a:t>
+            </a:r>
+            <a:r>
+              <a:rPr lang="en-US" dirty="0" smtClean="0"/>
+              <a:t>he </a:t>
+            </a:r>
+            <a:r>
+              <a:rPr lang="en-US" dirty="0"/>
+              <a:t>main difference between a class </a:t>
+            </a:r>
+            <a:r>
+              <a:rPr lang="en-US" dirty="0" smtClean="0"/>
+              <a:t>and an </a:t>
+            </a:r>
+            <a:r>
+              <a:rPr lang="en-US" dirty="0"/>
+              <a:t>ID selector is that ID's are </a:t>
+            </a:r>
+            <a:r>
+              <a:rPr lang="en-US" dirty="0" smtClean="0"/>
+              <a:t>unique. And </a:t>
+            </a:r>
+            <a:r>
+              <a:rPr lang="en-US" dirty="0"/>
+              <a:t>they're used to identify one element on the page.</a:t>
+            </a:r>
+          </a:p>
+          <a:p>
+            <a:pPr fontAlgn="base"/>
+            <a:r>
+              <a:rPr lang="en-US" dirty="0" smtClean="0"/>
+              <a:t>Whereas </a:t>
+            </a:r>
+            <a:r>
+              <a:rPr lang="en-US" dirty="0"/>
+              <a:t>a class can be used to classify and target more than one </a:t>
+            </a:r>
+            <a:r>
+              <a:rPr lang="en-US" dirty="0" smtClean="0"/>
+              <a:t>element. This </a:t>
+            </a:r>
+            <a:r>
+              <a:rPr lang="en-US" dirty="0"/>
+              <a:t>makes classes more flexible than </a:t>
+            </a:r>
+            <a:r>
+              <a:rPr lang="en-US" dirty="0" smtClean="0"/>
+              <a:t>ID's.</a:t>
+            </a:r>
+          </a:p>
+          <a:p>
+            <a:pPr fontAlgn="base"/>
+            <a:r>
+              <a:rPr lang="en-US" dirty="0"/>
+              <a:t>Classes let us target more than one element with the same class </a:t>
+            </a:r>
+            <a:r>
+              <a:rPr lang="en-US" dirty="0" smtClean="0"/>
+              <a:t>name. In </a:t>
+            </a:r>
+            <a:r>
+              <a:rPr lang="en-US" dirty="0"/>
+              <a:t>fact, that's one of the biggest advantages to using class selectors.</a:t>
+            </a:r>
+          </a:p>
+          <a:p>
+            <a:pPr fontAlgn="base"/>
+            <a:r>
+              <a:rPr lang="en-US" dirty="0" smtClean="0"/>
+              <a:t>Multiple </a:t>
+            </a:r>
+            <a:r>
+              <a:rPr lang="en-US" dirty="0"/>
+              <a:t>elements can share the same class, </a:t>
+            </a:r>
+            <a:r>
+              <a:rPr lang="en-US" dirty="0" smtClean="0"/>
+              <a:t>so we're </a:t>
+            </a:r>
+            <a:r>
+              <a:rPr lang="en-US" dirty="0"/>
+              <a:t>able to reuse them throughout a page</a:t>
+            </a:r>
+            <a:r>
+              <a:rPr lang="en-US" dirty="0" smtClean="0"/>
+              <a:t>.</a:t>
+            </a:r>
+            <a:endParaRPr lang="en-US" dirty="0"/>
+          </a:p>
+        </p:txBody>
+      </p:sp>
+    </p:spTree>
+    <p:extLst>
+      <p:ext uri="{BB962C8B-B14F-4D97-AF65-F5344CB8AC3E}">
+        <p14:creationId xmlns:p14="http://schemas.microsoft.com/office/powerpoint/2010/main" val="3135793116"/>
+      </p:ext>
+    </p:extLst>
+  </p:cSld>
+  <p:clrMapOvr>
+    <a:masterClrMapping/>
+  </p:clrMapOvr>
+</p:sld>
+</file>
+
+<file path=ppt/slides/slide31.xml><?xml version="1.0" encoding="utf-8"?>
+<p:sld xmlns:a="http://schemas.openxmlformats.org/drawingml/2006/main" xmlns:r="http://schemas.openxmlformats.org/officeDocument/2006/relationships" xmlns:p="http://schemas.openxmlformats.org/presentationml/2006/main">
+  <p:cSld>
+    <p:spTree>
+      <p:nvGrpSpPr>
+        <p:cNvPr id="1" name=""/>
+        <p:cNvGrpSpPr/>
+        <p:nvPr/>
+      </p:nvGrpSpPr>
+      <p:grpSpPr>
+        <a:xfrm>
+          <a:off x="0" y="0"/>
+          <a:ext cx="0" cy="0"/>
+          <a:chOff x="0" y="0"/>
+          <a:chExt cx="0" cy="0"/>
+        </a:xfrm>
+      </p:grpSpPr>
+      <p:sp>
+        <p:nvSpPr>
+          <p:cNvPr id="2" name="Title 1"/>
+          <p:cNvSpPr>
+            <a:spLocks noGrp="1"/>
+          </p:cNvSpPr>
+          <p:nvPr>
+            <p:ph type="title"/>
+          </p:nvPr>
+        </p:nvSpPr>
+        <p:spPr/>
+        <p:txBody>
+          <a:bodyPr/>
+          <a:lstStyle/>
+          <a:p>
+            <a:pPr fontAlgn="base"/>
+            <a:r>
+              <a:rPr lang="en-US" dirty="0"/>
+              <a:t>Descendant </a:t>
+            </a:r>
+            <a:r>
+              <a:rPr lang="en-US" dirty="0" smtClean="0"/>
+              <a:t>Selectors</a:t>
+            </a:r>
+            <a:endParaRPr lang="en-US" dirty="0"/>
+          </a:p>
+        </p:txBody>
+      </p:sp>
+      <p:sp>
+        <p:nvSpPr>
+          <p:cNvPr id="3" name="Content Placeholder 2"/>
+          <p:cNvSpPr>
+            <a:spLocks noGrp="1"/>
+          </p:cNvSpPr>
+          <p:nvPr>
+            <p:ph idx="1"/>
+          </p:nvPr>
+        </p:nvSpPr>
+        <p:spPr/>
+        <p:txBody>
+          <a:bodyPr/>
+          <a:lstStyle/>
+          <a:p>
+            <a:pPr fontAlgn="base"/>
+            <a:r>
+              <a:rPr lang="en-US" dirty="0"/>
+              <a:t>CSS also lets us target elements based on their relationship in the HTML document.</a:t>
+            </a:r>
+          </a:p>
+          <a:p>
+            <a:pPr fontAlgn="base"/>
+            <a:r>
+              <a:rPr lang="en-US" dirty="0" smtClean="0"/>
+              <a:t>For </a:t>
+            </a:r>
+            <a:r>
+              <a:rPr lang="en-US" dirty="0"/>
+              <a:t>instance, we can combine selectors to create what's called a </a:t>
+            </a:r>
+            <a:r>
+              <a:rPr lang="en-US" dirty="0" smtClean="0"/>
+              <a:t>descendent selector</a:t>
+            </a:r>
+            <a:r>
+              <a:rPr lang="en-US" dirty="0"/>
+              <a:t>, because it targets an element that's a descendent of another element.</a:t>
+            </a:r>
+          </a:p>
+          <a:p>
+            <a:pPr fontAlgn="base"/>
+            <a:r>
+              <a:rPr lang="en-US" dirty="0" smtClean="0"/>
+              <a:t>This </a:t>
+            </a:r>
+            <a:r>
+              <a:rPr lang="en-US" dirty="0"/>
+              <a:t>makes our selectors more specific</a:t>
+            </a:r>
+            <a:r>
+              <a:rPr lang="en-US" dirty="0" smtClean="0"/>
+              <a:t>.</a:t>
+            </a:r>
+            <a:endParaRPr lang="en-US" dirty="0"/>
+          </a:p>
+        </p:txBody>
+      </p:sp>
+    </p:spTree>
+    <p:extLst>
+      <p:ext uri="{BB962C8B-B14F-4D97-AF65-F5344CB8AC3E}">
+        <p14:creationId xmlns:p14="http://schemas.microsoft.com/office/powerpoint/2010/main" val="2053680725"/>
+      </p:ext>
+    </p:extLst>
+  </p:cSld>
+  <p:clrMapOvr>
+    <a:masterClrMapping/>
+  </p:clrMapOvr>
 </p:sld>
 </file>
 

</xml_diff>